<commit_message>
updated modellierung der sk Ausfuehrungskette.ppt
</commit_message>
<xml_diff>
--- a/Modellierung der sk Ausfuehrungskette.pptx
+++ b/Modellierung der sk Ausfuehrungskette.pptx
@@ -7,6 +7,8 @@
   <p:sldIdLst>
     <p:sldId id="256" r:id="rId3"/>
     <p:sldId id="262" r:id="rId4"/>
+    <p:sldId id="263" r:id="rId5"/>
+    <p:sldId id="264" r:id="rId6"/>
   </p:sldIdLst>
   <p:sldSz cx="12192000" cy="6858000"/>
   <p:notesSz cx="6858000" cy="9144000"/>
@@ -2516,9 +2518,12 @@
 <p:sldMaster xmlns:a="http://schemas.openxmlformats.org/drawingml/2006/main" xmlns:r="http://schemas.openxmlformats.org/officeDocument/2006/relationships" xmlns:p="http://schemas.openxmlformats.org/presentationml/2006/main">
   <p:cSld>
     <p:bg>
-      <p:bgRef idx="1001">
-        <a:schemeClr val="bg1"/>
-      </p:bgRef>
+      <p:bgPr>
+        <a:solidFill>
+          <a:schemeClr val="accent1"/>
+        </a:solidFill>
+        <a:effectLst/>
+      </p:bgPr>
     </p:bg>
     <p:spTree>
       <p:nvGrpSpPr>
@@ -3053,14 +3058,6 @@
 <file path=ppt/slides/slide1.xml><?xml version="1.0" encoding="utf-8"?>
 <p:sld xmlns:a="http://schemas.openxmlformats.org/drawingml/2006/main" xmlns:r="http://schemas.openxmlformats.org/officeDocument/2006/relationships" xmlns:p="http://schemas.openxmlformats.org/presentationml/2006/main">
   <p:cSld>
-    <p:bg>
-      <p:bgPr>
-        <a:solidFill>
-          <a:schemeClr val="accent1"/>
-        </a:solidFill>
-        <a:effectLst/>
-      </p:bgPr>
-    </p:bg>
     <p:spTree>
       <p:nvGrpSpPr>
         <p:cNvPr id="1" name=""/>
@@ -3446,14 +3443,427 @@
 <file path=ppt/slides/slide2.xml><?xml version="1.0" encoding="utf-8"?>
 <p:sld xmlns:a="http://schemas.openxmlformats.org/drawingml/2006/main" xmlns:r="http://schemas.openxmlformats.org/officeDocument/2006/relationships" xmlns:p="http://schemas.openxmlformats.org/presentationml/2006/main">
   <p:cSld>
-    <p:bg>
-      <p:bgPr>
-        <a:solidFill>
-          <a:schemeClr val="accent1"/>
-        </a:solidFill>
-        <a:effectLst/>
-      </p:bgPr>
-    </p:bg>
+    <p:spTree>
+      <p:nvGrpSpPr>
+        <p:cNvPr id="1" name=""/>
+        <p:cNvGrpSpPr/>
+        <p:nvPr/>
+      </p:nvGrpSpPr>
+      <p:grpSpPr/>
+      <p:sp>
+        <p:nvSpPr>
+          <p:cNvPr id="4" name="矩形 3"/>
+          <p:cNvSpPr/>
+          <p:nvPr/>
+        </p:nvSpPr>
+        <p:spPr>
+          <a:xfrm rot="5400000">
+            <a:off x="3460750" y="-1329055"/>
+            <a:ext cx="4987925" cy="9396095"/>
+          </a:xfrm>
+          <a:prstGeom prst="rect">
+            <a:avLst/>
+          </a:prstGeom>
+          <a:solidFill>
+            <a:srgbClr val="1A9614"/>
+          </a:solidFill>
+          <a:ln w="85725" cmpd="sng">
+            <a:solidFill>
+              <a:schemeClr val="bg1"/>
+            </a:solidFill>
+            <a:prstDash val="solid"/>
+          </a:ln>
+        </p:spPr>
+        <p:style>
+          <a:lnRef idx="2">
+            <a:schemeClr val="accent1">
+              <a:shade val="50000"/>
+            </a:schemeClr>
+          </a:lnRef>
+          <a:fillRef idx="1">
+            <a:schemeClr val="accent1"/>
+          </a:fillRef>
+          <a:effectRef idx="0">
+            <a:schemeClr val="accent1"/>
+          </a:effectRef>
+          <a:fontRef idx="minor">
+            <a:schemeClr val="lt1"/>
+          </a:fontRef>
+        </p:style>
+        <p:txBody>
+          <a:bodyPr rtlCol="0" anchor="ctr"/>
+          <a:p>
+            <a:pPr algn="ctr"/>
+            <a:endParaRPr lang="zh-CN" altLang="en-US"/>
+          </a:p>
+        </p:txBody>
+      </p:sp>
+      <p:cxnSp>
+        <p:nvCxnSpPr>
+          <p:cNvPr id="6" name="直接连接符 5"/>
+          <p:cNvCxnSpPr/>
+          <p:nvPr/>
+        </p:nvCxnSpPr>
+        <p:spPr>
+          <a:xfrm>
+            <a:off x="5950585" y="838835"/>
+            <a:ext cx="5715" cy="4975860"/>
+          </a:xfrm>
+          <a:prstGeom prst="line">
+            <a:avLst/>
+          </a:prstGeom>
+          <a:ln w="82550">
+            <a:solidFill>
+              <a:schemeClr val="bg1"/>
+            </a:solidFill>
+          </a:ln>
+        </p:spPr>
+        <p:style>
+          <a:lnRef idx="1">
+            <a:schemeClr val="accent1"/>
+          </a:lnRef>
+          <a:fillRef idx="0">
+            <a:schemeClr val="accent1"/>
+          </a:fillRef>
+          <a:effectRef idx="0">
+            <a:schemeClr val="accent1"/>
+          </a:effectRef>
+          <a:fontRef idx="minor">
+            <a:schemeClr val="tx1"/>
+          </a:fontRef>
+        </p:style>
+      </p:cxnSp>
+      <p:cxnSp>
+        <p:nvCxnSpPr>
+          <p:cNvPr id="7" name="直接连接符 6"/>
+          <p:cNvCxnSpPr/>
+          <p:nvPr/>
+        </p:nvCxnSpPr>
+        <p:spPr>
+          <a:xfrm rot="5400000" flipV="1">
+            <a:off x="9450705" y="3339465"/>
+            <a:ext cx="2470785" cy="0"/>
+          </a:xfrm>
+          <a:prstGeom prst="line">
+            <a:avLst/>
+          </a:prstGeom>
+          <a:ln w="139700">
+            <a:solidFill>
+              <a:srgbClr val="EEFD07"/>
+            </a:solidFill>
+          </a:ln>
+        </p:spPr>
+        <p:style>
+          <a:lnRef idx="1">
+            <a:schemeClr val="accent1"/>
+          </a:lnRef>
+          <a:fillRef idx="0">
+            <a:schemeClr val="accent1"/>
+          </a:fillRef>
+          <a:effectRef idx="0">
+            <a:schemeClr val="accent1"/>
+          </a:effectRef>
+          <a:fontRef idx="minor">
+            <a:schemeClr val="tx1"/>
+          </a:fontRef>
+        </p:style>
+      </p:cxnSp>
+      <p:cxnSp>
+        <p:nvCxnSpPr>
+          <p:cNvPr id="8" name="直接连接符 7"/>
+          <p:cNvCxnSpPr/>
+          <p:nvPr/>
+        </p:nvCxnSpPr>
+        <p:spPr>
+          <a:xfrm rot="5400000">
+            <a:off x="80010" y="3272155"/>
+            <a:ext cx="2470785" cy="0"/>
+          </a:xfrm>
+          <a:prstGeom prst="line">
+            <a:avLst/>
+          </a:prstGeom>
+          <a:ln w="139700">
+            <a:solidFill>
+              <a:srgbClr val="EEFD07"/>
+            </a:solidFill>
+          </a:ln>
+        </p:spPr>
+        <p:style>
+          <a:lnRef idx="1">
+            <a:schemeClr val="accent1"/>
+          </a:lnRef>
+          <a:fillRef idx="0">
+            <a:schemeClr val="accent1"/>
+          </a:fillRef>
+          <a:effectRef idx="0">
+            <a:schemeClr val="accent1"/>
+          </a:effectRef>
+          <a:fontRef idx="minor">
+            <a:schemeClr val="tx1"/>
+          </a:fontRef>
+        </p:style>
+      </p:cxnSp>
+      <p:sp>
+        <p:nvSpPr>
+          <p:cNvPr id="14" name="椭圆 13"/>
+          <p:cNvSpPr/>
+          <p:nvPr/>
+        </p:nvSpPr>
+        <p:spPr>
+          <a:xfrm>
+            <a:off x="4866640" y="1016635"/>
+            <a:ext cx="521335" cy="521335"/>
+          </a:xfrm>
+          <a:prstGeom prst="ellipse">
+            <a:avLst/>
+          </a:prstGeom>
+          <a:gradFill>
+            <a:gsLst>
+              <a:gs pos="0">
+                <a:srgbClr val="FF0000"/>
+              </a:gs>
+              <a:gs pos="100000">
+                <a:srgbClr val="760303"/>
+              </a:gs>
+            </a:gsLst>
+            <a:lin ang="5400000" scaled="0"/>
+          </a:gradFill>
+        </p:spPr>
+        <p:style>
+          <a:lnRef idx="2">
+            <a:schemeClr val="accent1">
+              <a:shade val="50000"/>
+            </a:schemeClr>
+          </a:lnRef>
+          <a:fillRef idx="1">
+            <a:schemeClr val="accent1"/>
+          </a:fillRef>
+          <a:effectRef idx="0">
+            <a:schemeClr val="accent1"/>
+          </a:effectRef>
+          <a:fontRef idx="minor">
+            <a:schemeClr val="lt1"/>
+          </a:fontRef>
+        </p:style>
+        <p:txBody>
+          <a:bodyPr rtlCol="0" anchor="ctr"/>
+          <a:p>
+            <a:pPr algn="ctr"/>
+            <a:endParaRPr lang="zh-CN" altLang="en-US"/>
+          </a:p>
+        </p:txBody>
+      </p:sp>
+      <p:cxnSp>
+        <p:nvCxnSpPr>
+          <p:cNvPr id="3" name="直接箭头连接符 2"/>
+          <p:cNvCxnSpPr/>
+          <p:nvPr/>
+        </p:nvCxnSpPr>
+        <p:spPr>
+          <a:xfrm flipV="1">
+            <a:off x="2494280" y="1129030"/>
+            <a:ext cx="1851660" cy="2606040"/>
+          </a:xfrm>
+          <a:prstGeom prst="straightConnector1">
+            <a:avLst/>
+          </a:prstGeom>
+          <a:ln w="76200" cmpd="sng">
+            <a:solidFill>
+              <a:srgbClr val="7030A0"/>
+            </a:solidFill>
+            <a:prstDash val="solid"/>
+            <a:tailEnd type="arrow"/>
+          </a:ln>
+        </p:spPr>
+        <p:style>
+          <a:lnRef idx="1">
+            <a:schemeClr val="accent1"/>
+          </a:lnRef>
+          <a:fillRef idx="0">
+            <a:schemeClr val="accent1"/>
+          </a:fillRef>
+          <a:effectRef idx="0">
+            <a:schemeClr val="accent1"/>
+          </a:effectRef>
+          <a:fontRef idx="minor">
+            <a:schemeClr val="tx1"/>
+          </a:fontRef>
+        </p:style>
+      </p:cxnSp>
+      <p:sp>
+        <p:nvSpPr>
+          <p:cNvPr id="12" name="椭圆 11"/>
+          <p:cNvSpPr/>
+          <p:nvPr/>
+        </p:nvSpPr>
+        <p:spPr>
+          <a:xfrm>
+            <a:off x="1973580" y="3594735"/>
+            <a:ext cx="676275" cy="634365"/>
+          </a:xfrm>
+          <a:prstGeom prst="ellipse">
+            <a:avLst/>
+          </a:prstGeom>
+          <a:gradFill>
+            <a:gsLst>
+              <a:gs pos="0">
+                <a:srgbClr val="FE4444"/>
+              </a:gs>
+              <a:gs pos="100000">
+                <a:srgbClr val="832B2B"/>
+              </a:gs>
+            </a:gsLst>
+            <a:lin ang="5400000" scaled="0"/>
+          </a:gradFill>
+          <a:ln>
+            <a:solidFill>
+              <a:srgbClr val="3838A8"/>
+            </a:solidFill>
+          </a:ln>
+        </p:spPr>
+        <p:style>
+          <a:lnRef idx="2">
+            <a:schemeClr val="accent2">
+              <a:shade val="50000"/>
+            </a:schemeClr>
+          </a:lnRef>
+          <a:fillRef idx="1">
+            <a:schemeClr val="accent2"/>
+          </a:fillRef>
+          <a:effectRef idx="0">
+            <a:schemeClr val="accent2"/>
+          </a:effectRef>
+          <a:fontRef idx="minor">
+            <a:schemeClr val="lt1"/>
+          </a:fontRef>
+        </p:style>
+        <p:txBody>
+          <a:bodyPr anchor="ctr"/>
+          <a:p>
+            <a:pPr marL="0" marR="0" lvl="0" indent="0" algn="ctr" defTabSz="914400" rtl="0" eaLnBrk="1" fontAlgn="base" latinLnBrk="0" hangingPunct="1">
+              <a:spcBef>
+                <a:spcPct val="0"/>
+              </a:spcBef>
+              <a:spcAft>
+                <a:spcPct val="0"/>
+              </a:spcAft>
+              <a:buClrTx/>
+              <a:buSzTx/>
+              <a:buFont typeface="Arial" charset="0"/>
+              <a:buNone/>
+              <a:defRPr/>
+            </a:pPr>
+            <a:r>
+              <a:rPr kumimoji="0" lang="en-US" sz="1800" b="0" i="0" u="none" strike="noStrike" kern="1200" cap="none" spc="0" normalizeH="0" baseline="0" noProof="1">
+                <a:ln>
+                  <a:noFill/>
+                </a:ln>
+                <a:solidFill>
+                  <a:schemeClr val="lt1"/>
+                </a:solidFill>
+                <a:effectLst/>
+                <a:uLnTx/>
+                <a:uFillTx/>
+                <a:latin typeface="+mn-lt"/>
+                <a:ea typeface="+mn-ea"/>
+                <a:cs typeface="+mn-cs"/>
+                <a:sym typeface="+mn-ea"/>
+              </a:rPr>
+              <a:t>1</a:t>
+            </a:r>
+            <a:endParaRPr lang="en-US"/>
+          </a:p>
+        </p:txBody>
+      </p:sp>
+      <p:sp>
+        <p:nvSpPr>
+          <p:cNvPr id="16" name="椭圆 15"/>
+          <p:cNvSpPr/>
+          <p:nvPr/>
+        </p:nvSpPr>
+        <p:spPr>
+          <a:xfrm>
+            <a:off x="4258945" y="759460"/>
+            <a:ext cx="676275" cy="634365"/>
+          </a:xfrm>
+          <a:prstGeom prst="ellipse">
+            <a:avLst/>
+          </a:prstGeom>
+          <a:gradFill>
+            <a:gsLst>
+              <a:gs pos="0">
+                <a:srgbClr val="FECF40"/>
+              </a:gs>
+              <a:gs pos="100000">
+                <a:srgbClr val="846C21"/>
+              </a:gs>
+            </a:gsLst>
+            <a:lin ang="5400000" scaled="0"/>
+          </a:gradFill>
+          <a:ln>
+            <a:solidFill>
+              <a:srgbClr val="3838A8"/>
+            </a:solidFill>
+          </a:ln>
+        </p:spPr>
+        <p:style>
+          <a:lnRef idx="2">
+            <a:schemeClr val="accent2">
+              <a:shade val="50000"/>
+            </a:schemeClr>
+          </a:lnRef>
+          <a:fillRef idx="1">
+            <a:schemeClr val="accent2"/>
+          </a:fillRef>
+          <a:effectRef idx="0">
+            <a:schemeClr val="accent2"/>
+          </a:effectRef>
+          <a:fontRef idx="minor">
+            <a:schemeClr val="lt1"/>
+          </a:fontRef>
+        </p:style>
+        <p:txBody>
+          <a:bodyPr anchor="ctr"/>
+          <a:p>
+            <a:pPr marL="0" marR="0" lvl="0" indent="0" algn="ctr" defTabSz="914400" rtl="0" eaLnBrk="1" fontAlgn="base" latinLnBrk="0" hangingPunct="1">
+              <a:spcBef>
+                <a:spcPct val="0"/>
+              </a:spcBef>
+              <a:spcAft>
+                <a:spcPct val="0"/>
+              </a:spcAft>
+              <a:buClrTx/>
+              <a:buSzTx/>
+              <a:buFont typeface="Arial" charset="0"/>
+              <a:buNone/>
+              <a:defRPr/>
+            </a:pPr>
+            <a:r>
+              <a:rPr lang="en-US"/>
+              <a:t>2</a:t>
+            </a:r>
+            <a:endParaRPr lang="en-US"/>
+          </a:p>
+        </p:txBody>
+      </p:sp>
+    </p:spTree>
+  </p:cSld>
+  <p:clrMapOvr>
+    <a:masterClrMapping/>
+  </p:clrMapOvr>
+  <p:timing>
+    <p:tnLst>
+      <p:par>
+        <p:cTn id="1" dur="indefinite" restart="never" nodeType="tmRoot"/>
+      </p:par>
+    </p:tnLst>
+  </p:timing>
+</p:sld>
+</file>
+
+<file path=ppt/slides/slide3.xml><?xml version="1.0" encoding="utf-8"?>
+<p:sld xmlns:a="http://schemas.openxmlformats.org/drawingml/2006/main" xmlns:r="http://schemas.openxmlformats.org/officeDocument/2006/relationships" xmlns:p="http://schemas.openxmlformats.org/presentationml/2006/main">
+  <p:cSld>
     <p:spTree>
       <p:nvGrpSpPr>
         <p:cNvPr id="1" name=""/>
@@ -3826,123 +4236,6 @@
           </a:fontRef>
         </p:style>
       </p:cxnSp>
-      <p:cxnSp>
-        <p:nvCxnSpPr>
-          <p:cNvPr id="5" name="直接连接符 4"/>
-          <p:cNvCxnSpPr/>
-          <p:nvPr/>
-        </p:nvCxnSpPr>
-        <p:spPr>
-          <a:xfrm>
-            <a:off x="594360" y="3383915"/>
-            <a:ext cx="11596370" cy="14605"/>
-          </a:xfrm>
-          <a:prstGeom prst="line">
-            <a:avLst/>
-          </a:prstGeom>
-          <a:ln w="57150">
-            <a:solidFill>
-              <a:schemeClr val="tx1">
-                <a:lumMod val="95000"/>
-                <a:lumOff val="5000"/>
-                <a:alpha val="50000"/>
-              </a:schemeClr>
-            </a:solidFill>
-          </a:ln>
-        </p:spPr>
-        <p:style>
-          <a:lnRef idx="1">
-            <a:schemeClr val="accent1"/>
-          </a:lnRef>
-          <a:fillRef idx="0">
-            <a:schemeClr val="accent1"/>
-          </a:fillRef>
-          <a:effectRef idx="0">
-            <a:schemeClr val="accent1"/>
-          </a:effectRef>
-          <a:fontRef idx="minor">
-            <a:schemeClr val="tx1"/>
-          </a:fontRef>
-        </p:style>
-      </p:cxnSp>
-      <p:cxnSp>
-        <p:nvCxnSpPr>
-          <p:cNvPr id="9" name="直接箭头连接符 8"/>
-          <p:cNvCxnSpPr>
-            <a:stCxn id="14" idx="6"/>
-          </p:cNvCxnSpPr>
-          <p:nvPr/>
-        </p:nvCxnSpPr>
-        <p:spPr>
-          <a:xfrm>
-            <a:off x="7218680" y="2989580"/>
-            <a:ext cx="1697355" cy="6985"/>
-          </a:xfrm>
-          <a:prstGeom prst="straightConnector1">
-            <a:avLst/>
-          </a:prstGeom>
-          <a:ln w="73025">
-            <a:solidFill>
-              <a:schemeClr val="accent3">
-                <a:lumMod val="75000"/>
-              </a:schemeClr>
-            </a:solidFill>
-            <a:tailEnd type="arrow"/>
-          </a:ln>
-        </p:spPr>
-        <p:style>
-          <a:lnRef idx="1">
-            <a:schemeClr val="accent1"/>
-          </a:lnRef>
-          <a:fillRef idx="0">
-            <a:schemeClr val="accent1"/>
-          </a:fillRef>
-          <a:effectRef idx="0">
-            <a:schemeClr val="accent1"/>
-          </a:effectRef>
-          <a:fontRef idx="minor">
-            <a:schemeClr val="tx1"/>
-          </a:fontRef>
-        </p:style>
-      </p:cxnSp>
-      <p:cxnSp>
-        <p:nvCxnSpPr>
-          <p:cNvPr id="10" name="直接箭头连接符 9"/>
-          <p:cNvCxnSpPr/>
-          <p:nvPr/>
-        </p:nvCxnSpPr>
-        <p:spPr>
-          <a:xfrm flipV="1">
-            <a:off x="9466580" y="2148205"/>
-            <a:ext cx="1265555" cy="788670"/>
-          </a:xfrm>
-          <a:prstGeom prst="straightConnector1">
-            <a:avLst/>
-          </a:prstGeom>
-          <a:ln w="63500">
-            <a:solidFill>
-              <a:schemeClr val="bg1">
-                <a:lumMod val="65000"/>
-              </a:schemeClr>
-            </a:solidFill>
-            <a:tailEnd type="arrow"/>
-          </a:ln>
-        </p:spPr>
-        <p:style>
-          <a:lnRef idx="1">
-            <a:schemeClr val="accent1"/>
-          </a:lnRef>
-          <a:fillRef idx="0">
-            <a:schemeClr val="accent1"/>
-          </a:fillRef>
-          <a:effectRef idx="0">
-            <a:schemeClr val="accent1"/>
-          </a:effectRef>
-          <a:fontRef idx="minor">
-            <a:schemeClr val="tx1"/>
-          </a:fontRef>
-        </p:style>
-      </p:cxnSp>
       <p:sp>
         <p:nvSpPr>
           <p:cNvPr id="12" name="椭圆 11"/>
@@ -4099,6 +4392,667 @@
           </a:p>
         </p:txBody>
       </p:sp>
+    </p:spTree>
+  </p:cSld>
+  <p:clrMapOvr>
+    <a:masterClrMapping/>
+  </p:clrMapOvr>
+  <p:timing>
+    <p:tnLst>
+      <p:par>
+        <p:cTn id="1" dur="indefinite" restart="never" nodeType="tmRoot"/>
+      </p:par>
+    </p:tnLst>
+  </p:timing>
+</p:sld>
+</file>
+
+<file path=ppt/slides/slide4.xml><?xml version="1.0" encoding="utf-8"?>
+<p:sld xmlns:a="http://schemas.openxmlformats.org/drawingml/2006/main" xmlns:r="http://schemas.openxmlformats.org/officeDocument/2006/relationships" xmlns:p="http://schemas.openxmlformats.org/presentationml/2006/main">
+  <p:cSld>
+    <p:spTree>
+      <p:nvGrpSpPr>
+        <p:cNvPr id="1" name=""/>
+        <p:cNvGrpSpPr/>
+        <p:nvPr/>
+      </p:nvGrpSpPr>
+      <p:grpSpPr/>
+      <p:sp>
+        <p:nvSpPr>
+          <p:cNvPr id="4" name="矩形 3"/>
+          <p:cNvSpPr/>
+          <p:nvPr/>
+        </p:nvSpPr>
+        <p:spPr>
+          <a:xfrm rot="5400000">
+            <a:off x="3460750" y="-1329055"/>
+            <a:ext cx="4987925" cy="9396095"/>
+          </a:xfrm>
+          <a:prstGeom prst="rect">
+            <a:avLst/>
+          </a:prstGeom>
+          <a:solidFill>
+            <a:srgbClr val="1A9614"/>
+          </a:solidFill>
+          <a:ln w="85725" cmpd="sng">
+            <a:solidFill>
+              <a:schemeClr val="bg1"/>
+            </a:solidFill>
+            <a:prstDash val="solid"/>
+          </a:ln>
+        </p:spPr>
+        <p:style>
+          <a:lnRef idx="2">
+            <a:schemeClr val="accent1">
+              <a:shade val="50000"/>
+            </a:schemeClr>
+          </a:lnRef>
+          <a:fillRef idx="1">
+            <a:schemeClr val="accent1"/>
+          </a:fillRef>
+          <a:effectRef idx="0">
+            <a:schemeClr val="accent1"/>
+          </a:effectRef>
+          <a:fontRef idx="minor">
+            <a:schemeClr val="lt1"/>
+          </a:fontRef>
+        </p:style>
+        <p:txBody>
+          <a:bodyPr rtlCol="0" anchor="ctr"/>
+          <a:p>
+            <a:pPr algn="ctr"/>
+            <a:endParaRPr lang="zh-CN" altLang="en-US"/>
+          </a:p>
+        </p:txBody>
+      </p:sp>
+      <p:cxnSp>
+        <p:nvCxnSpPr>
+          <p:cNvPr id="6" name="直接连接符 5"/>
+          <p:cNvCxnSpPr/>
+          <p:nvPr/>
+        </p:nvCxnSpPr>
+        <p:spPr>
+          <a:xfrm>
+            <a:off x="5950585" y="838835"/>
+            <a:ext cx="5715" cy="4975860"/>
+          </a:xfrm>
+          <a:prstGeom prst="line">
+            <a:avLst/>
+          </a:prstGeom>
+          <a:ln w="82550">
+            <a:solidFill>
+              <a:schemeClr val="bg1"/>
+            </a:solidFill>
+          </a:ln>
+        </p:spPr>
+        <p:style>
+          <a:lnRef idx="1">
+            <a:schemeClr val="accent1"/>
+          </a:lnRef>
+          <a:fillRef idx="0">
+            <a:schemeClr val="accent1"/>
+          </a:fillRef>
+          <a:effectRef idx="0">
+            <a:schemeClr val="accent1"/>
+          </a:effectRef>
+          <a:fontRef idx="minor">
+            <a:schemeClr val="tx1"/>
+          </a:fontRef>
+        </p:style>
+      </p:cxnSp>
+      <p:cxnSp>
+        <p:nvCxnSpPr>
+          <p:cNvPr id="7" name="直接连接符 6"/>
+          <p:cNvCxnSpPr/>
+          <p:nvPr/>
+        </p:nvCxnSpPr>
+        <p:spPr>
+          <a:xfrm rot="5400000" flipV="1">
+            <a:off x="9450705" y="3339465"/>
+            <a:ext cx="2470785" cy="0"/>
+          </a:xfrm>
+          <a:prstGeom prst="line">
+            <a:avLst/>
+          </a:prstGeom>
+          <a:ln w="139700">
+            <a:solidFill>
+              <a:srgbClr val="EEFD07"/>
+            </a:solidFill>
+          </a:ln>
+        </p:spPr>
+        <p:style>
+          <a:lnRef idx="1">
+            <a:schemeClr val="accent1"/>
+          </a:lnRef>
+          <a:fillRef idx="0">
+            <a:schemeClr val="accent1"/>
+          </a:fillRef>
+          <a:effectRef idx="0">
+            <a:schemeClr val="accent1"/>
+          </a:effectRef>
+          <a:fontRef idx="minor">
+            <a:schemeClr val="tx1"/>
+          </a:fontRef>
+        </p:style>
+      </p:cxnSp>
+      <p:cxnSp>
+        <p:nvCxnSpPr>
+          <p:cNvPr id="8" name="直接连接符 7"/>
+          <p:cNvCxnSpPr/>
+          <p:nvPr/>
+        </p:nvCxnSpPr>
+        <p:spPr>
+          <a:xfrm rot="5400000">
+            <a:off x="80010" y="3272155"/>
+            <a:ext cx="2470785" cy="0"/>
+          </a:xfrm>
+          <a:prstGeom prst="line">
+            <a:avLst/>
+          </a:prstGeom>
+          <a:ln w="139700">
+            <a:solidFill>
+              <a:srgbClr val="EEFD07"/>
+            </a:solidFill>
+          </a:ln>
+        </p:spPr>
+        <p:style>
+          <a:lnRef idx="1">
+            <a:schemeClr val="accent1"/>
+          </a:lnRef>
+          <a:fillRef idx="0">
+            <a:schemeClr val="accent1"/>
+          </a:fillRef>
+          <a:effectRef idx="0">
+            <a:schemeClr val="accent1"/>
+          </a:effectRef>
+          <a:fontRef idx="minor">
+            <a:schemeClr val="tx1"/>
+          </a:fontRef>
+        </p:style>
+      </p:cxnSp>
+      <p:sp>
+        <p:nvSpPr>
+          <p:cNvPr id="13" name="椭圆 12"/>
+          <p:cNvSpPr/>
+          <p:nvPr/>
+        </p:nvSpPr>
+        <p:spPr>
+          <a:xfrm>
+            <a:off x="6044565" y="2604770"/>
+            <a:ext cx="676275" cy="634365"/>
+          </a:xfrm>
+          <a:prstGeom prst="ellipse">
+            <a:avLst/>
+          </a:prstGeom>
+          <a:gradFill>
+            <a:gsLst>
+              <a:gs pos="0">
+                <a:srgbClr val="FBFB11"/>
+              </a:gs>
+              <a:gs pos="100000">
+                <a:srgbClr val="838309"/>
+              </a:gs>
+            </a:gsLst>
+            <a:lin ang="5400000" scaled="0"/>
+          </a:gradFill>
+          <a:ln>
+            <a:solidFill>
+              <a:srgbClr val="3838A8"/>
+            </a:solidFill>
+          </a:ln>
+        </p:spPr>
+        <p:style>
+          <a:lnRef idx="2">
+            <a:schemeClr val="accent2">
+              <a:shade val="50000"/>
+            </a:schemeClr>
+          </a:lnRef>
+          <a:fillRef idx="1">
+            <a:schemeClr val="accent2"/>
+          </a:fillRef>
+          <a:effectRef idx="0">
+            <a:schemeClr val="accent2"/>
+          </a:effectRef>
+          <a:fontRef idx="minor">
+            <a:schemeClr val="lt1"/>
+          </a:fontRef>
+        </p:style>
+        <p:txBody>
+          <a:bodyPr anchor="ctr"/>
+          <a:p>
+            <a:pPr marL="0" marR="0" lvl="0" indent="0" algn="ctr" defTabSz="914400" rtl="0" eaLnBrk="1" fontAlgn="base" latinLnBrk="0" hangingPunct="1">
+              <a:spcBef>
+                <a:spcPct val="0"/>
+              </a:spcBef>
+              <a:spcAft>
+                <a:spcPct val="0"/>
+              </a:spcAft>
+              <a:buClrTx/>
+              <a:buSzTx/>
+              <a:buFont typeface="Arial" charset="0"/>
+              <a:buNone/>
+              <a:defRPr/>
+            </a:pPr>
+            <a:r>
+              <a:rPr kumimoji="0" lang="en-US" sz="1800" b="0" i="0" u="none" strike="noStrike" kern="1200" cap="none" spc="0" normalizeH="0" baseline="0" noProof="1">
+                <a:ln>
+                  <a:noFill/>
+                </a:ln>
+                <a:solidFill>
+                  <a:schemeClr val="lt1"/>
+                </a:solidFill>
+                <a:effectLst/>
+                <a:uLnTx/>
+                <a:uFillTx/>
+                <a:latin typeface="+mn-lt"/>
+                <a:ea typeface="+mn-ea"/>
+                <a:cs typeface="+mn-cs"/>
+                <a:sym typeface="+mn-ea"/>
+              </a:rPr>
+              <a:t>3</a:t>
+            </a:r>
+            <a:endParaRPr lang="en-US"/>
+          </a:p>
+        </p:txBody>
+      </p:sp>
+      <p:sp>
+        <p:nvSpPr>
+          <p:cNvPr id="14" name="椭圆 13"/>
+          <p:cNvSpPr/>
+          <p:nvPr/>
+        </p:nvSpPr>
+        <p:spPr>
+          <a:xfrm>
+            <a:off x="9658985" y="3369310"/>
+            <a:ext cx="521335" cy="521335"/>
+          </a:xfrm>
+          <a:prstGeom prst="ellipse">
+            <a:avLst/>
+          </a:prstGeom>
+          <a:gradFill>
+            <a:gsLst>
+              <a:gs pos="0">
+                <a:srgbClr val="FF0000"/>
+              </a:gs>
+              <a:gs pos="100000">
+                <a:srgbClr val="760303"/>
+              </a:gs>
+            </a:gsLst>
+            <a:lin ang="5400000" scaled="0"/>
+          </a:gradFill>
+        </p:spPr>
+        <p:style>
+          <a:lnRef idx="2">
+            <a:schemeClr val="accent1">
+              <a:shade val="50000"/>
+            </a:schemeClr>
+          </a:lnRef>
+          <a:fillRef idx="1">
+            <a:schemeClr val="accent1"/>
+          </a:fillRef>
+          <a:effectRef idx="0">
+            <a:schemeClr val="accent1"/>
+          </a:effectRef>
+          <a:fontRef idx="minor">
+            <a:schemeClr val="lt1"/>
+          </a:fontRef>
+        </p:style>
+        <p:txBody>
+          <a:bodyPr rtlCol="0" anchor="ctr"/>
+          <a:p>
+            <a:pPr algn="ctr"/>
+            <a:endParaRPr lang="zh-CN" altLang="en-US"/>
+          </a:p>
+        </p:txBody>
+      </p:sp>
+      <p:cxnSp>
+        <p:nvCxnSpPr>
+          <p:cNvPr id="2" name="直接箭头连接符 1"/>
+          <p:cNvCxnSpPr>
+            <a:endCxn id="13" idx="1"/>
+          </p:cNvCxnSpPr>
+          <p:nvPr/>
+        </p:nvCxnSpPr>
+        <p:spPr>
+          <a:xfrm>
+            <a:off x="4834255" y="1275080"/>
+            <a:ext cx="1309370" cy="1422400"/>
+          </a:xfrm>
+          <a:prstGeom prst="straightConnector1">
+            <a:avLst/>
+          </a:prstGeom>
+          <a:ln w="76200">
+            <a:solidFill>
+              <a:schemeClr val="tx2">
+                <a:lumMod val="50000"/>
+              </a:schemeClr>
+            </a:solidFill>
+            <a:tailEnd type="arrow"/>
+          </a:ln>
+        </p:spPr>
+        <p:style>
+          <a:lnRef idx="1">
+            <a:schemeClr val="accent1"/>
+          </a:lnRef>
+          <a:fillRef idx="0">
+            <a:schemeClr val="accent1"/>
+          </a:fillRef>
+          <a:effectRef idx="0">
+            <a:schemeClr val="accent1"/>
+          </a:effectRef>
+          <a:fontRef idx="minor">
+            <a:schemeClr val="tx1"/>
+          </a:fontRef>
+        </p:style>
+      </p:cxnSp>
+      <p:cxnSp>
+        <p:nvCxnSpPr>
+          <p:cNvPr id="3" name="直接箭头连接符 2"/>
+          <p:cNvCxnSpPr/>
+          <p:nvPr/>
+        </p:nvCxnSpPr>
+        <p:spPr>
+          <a:xfrm flipV="1">
+            <a:off x="2494280" y="1129030"/>
+            <a:ext cx="1851660" cy="2606040"/>
+          </a:xfrm>
+          <a:prstGeom prst="straightConnector1">
+            <a:avLst/>
+          </a:prstGeom>
+          <a:ln w="76200" cmpd="sng">
+            <a:solidFill>
+              <a:srgbClr val="7030A0"/>
+            </a:solidFill>
+            <a:prstDash val="solid"/>
+            <a:tailEnd type="arrow"/>
+          </a:ln>
+        </p:spPr>
+        <p:style>
+          <a:lnRef idx="1">
+            <a:schemeClr val="accent1"/>
+          </a:lnRef>
+          <a:fillRef idx="0">
+            <a:schemeClr val="accent1"/>
+          </a:fillRef>
+          <a:effectRef idx="0">
+            <a:schemeClr val="accent1"/>
+          </a:effectRef>
+          <a:fontRef idx="minor">
+            <a:schemeClr val="tx1"/>
+          </a:fontRef>
+        </p:style>
+      </p:cxnSp>
+      <p:cxnSp>
+        <p:nvCxnSpPr>
+          <p:cNvPr id="5" name="直接连接符 4"/>
+          <p:cNvCxnSpPr/>
+          <p:nvPr/>
+        </p:nvCxnSpPr>
+        <p:spPr>
+          <a:xfrm>
+            <a:off x="594360" y="3383915"/>
+            <a:ext cx="11596370" cy="14605"/>
+          </a:xfrm>
+          <a:prstGeom prst="line">
+            <a:avLst/>
+          </a:prstGeom>
+          <a:ln w="57150">
+            <a:solidFill>
+              <a:schemeClr val="tx1">
+                <a:lumMod val="95000"/>
+                <a:lumOff val="5000"/>
+                <a:alpha val="50000"/>
+              </a:schemeClr>
+            </a:solidFill>
+          </a:ln>
+        </p:spPr>
+        <p:style>
+          <a:lnRef idx="1">
+            <a:schemeClr val="accent1"/>
+          </a:lnRef>
+          <a:fillRef idx="0">
+            <a:schemeClr val="accent1"/>
+          </a:fillRef>
+          <a:effectRef idx="0">
+            <a:schemeClr val="accent1"/>
+          </a:effectRef>
+          <a:fontRef idx="minor">
+            <a:schemeClr val="tx1"/>
+          </a:fontRef>
+        </p:style>
+      </p:cxnSp>
+      <p:cxnSp>
+        <p:nvCxnSpPr>
+          <p:cNvPr id="9" name="直接箭头连接符 8"/>
+          <p:cNvCxnSpPr/>
+          <p:nvPr/>
+        </p:nvCxnSpPr>
+        <p:spPr>
+          <a:xfrm>
+            <a:off x="6786880" y="2974975"/>
+            <a:ext cx="2307590" cy="758190"/>
+          </a:xfrm>
+          <a:prstGeom prst="straightConnector1">
+            <a:avLst/>
+          </a:prstGeom>
+          <a:ln w="73025">
+            <a:solidFill>
+              <a:schemeClr val="accent3">
+                <a:lumMod val="75000"/>
+              </a:schemeClr>
+            </a:solidFill>
+            <a:tailEnd type="arrow"/>
+          </a:ln>
+        </p:spPr>
+        <p:style>
+          <a:lnRef idx="1">
+            <a:schemeClr val="accent1"/>
+          </a:lnRef>
+          <a:fillRef idx="0">
+            <a:schemeClr val="accent1"/>
+          </a:fillRef>
+          <a:effectRef idx="0">
+            <a:schemeClr val="accent1"/>
+          </a:effectRef>
+          <a:fontRef idx="minor">
+            <a:schemeClr val="tx1"/>
+          </a:fontRef>
+        </p:style>
+      </p:cxnSp>
+      <p:cxnSp>
+        <p:nvCxnSpPr>
+          <p:cNvPr id="10" name="直接箭头连接符 9"/>
+          <p:cNvCxnSpPr/>
+          <p:nvPr/>
+        </p:nvCxnSpPr>
+        <p:spPr>
+          <a:xfrm flipV="1">
+            <a:off x="10151745" y="2691130"/>
+            <a:ext cx="386715" cy="803910"/>
+          </a:xfrm>
+          <a:prstGeom prst="straightConnector1">
+            <a:avLst/>
+          </a:prstGeom>
+          <a:ln w="63500">
+            <a:solidFill>
+              <a:schemeClr val="bg1">
+                <a:lumMod val="65000"/>
+              </a:schemeClr>
+            </a:solidFill>
+            <a:tailEnd type="arrow"/>
+          </a:ln>
+        </p:spPr>
+        <p:style>
+          <a:lnRef idx="1">
+            <a:schemeClr val="accent1"/>
+          </a:lnRef>
+          <a:fillRef idx="0">
+            <a:schemeClr val="accent1"/>
+          </a:fillRef>
+          <a:effectRef idx="0">
+            <a:schemeClr val="accent1"/>
+          </a:effectRef>
+          <a:fontRef idx="minor">
+            <a:schemeClr val="tx1"/>
+          </a:fontRef>
+        </p:style>
+      </p:cxnSp>
+      <p:sp>
+        <p:nvSpPr>
+          <p:cNvPr id="12" name="椭圆 11"/>
+          <p:cNvSpPr/>
+          <p:nvPr/>
+        </p:nvSpPr>
+        <p:spPr>
+          <a:xfrm>
+            <a:off x="1973580" y="3594735"/>
+            <a:ext cx="676275" cy="634365"/>
+          </a:xfrm>
+          <a:prstGeom prst="ellipse">
+            <a:avLst/>
+          </a:prstGeom>
+          <a:gradFill>
+            <a:gsLst>
+              <a:gs pos="0">
+                <a:srgbClr val="FE4444"/>
+              </a:gs>
+              <a:gs pos="100000">
+                <a:srgbClr val="832B2B"/>
+              </a:gs>
+            </a:gsLst>
+            <a:lin ang="5400000" scaled="0"/>
+          </a:gradFill>
+          <a:ln>
+            <a:solidFill>
+              <a:srgbClr val="3838A8"/>
+            </a:solidFill>
+          </a:ln>
+        </p:spPr>
+        <p:style>
+          <a:lnRef idx="2">
+            <a:schemeClr val="accent2">
+              <a:shade val="50000"/>
+            </a:schemeClr>
+          </a:lnRef>
+          <a:fillRef idx="1">
+            <a:schemeClr val="accent2"/>
+          </a:fillRef>
+          <a:effectRef idx="0">
+            <a:schemeClr val="accent2"/>
+          </a:effectRef>
+          <a:fontRef idx="minor">
+            <a:schemeClr val="lt1"/>
+          </a:fontRef>
+        </p:style>
+        <p:txBody>
+          <a:bodyPr anchor="ctr"/>
+          <a:p>
+            <a:pPr marL="0" marR="0" lvl="0" indent="0" algn="ctr" defTabSz="914400" rtl="0" eaLnBrk="1" fontAlgn="base" latinLnBrk="0" hangingPunct="1">
+              <a:spcBef>
+                <a:spcPct val="0"/>
+              </a:spcBef>
+              <a:spcAft>
+                <a:spcPct val="0"/>
+              </a:spcAft>
+              <a:buClrTx/>
+              <a:buSzTx/>
+              <a:buFont typeface="Arial" charset="0"/>
+              <a:buNone/>
+              <a:defRPr/>
+            </a:pPr>
+            <a:r>
+              <a:rPr kumimoji="0" lang="en-US" sz="1800" b="0" i="0" u="none" strike="noStrike" kern="1200" cap="none" spc="0" normalizeH="0" baseline="0" noProof="1">
+                <a:ln>
+                  <a:noFill/>
+                </a:ln>
+                <a:solidFill>
+                  <a:schemeClr val="lt1"/>
+                </a:solidFill>
+                <a:effectLst/>
+                <a:uLnTx/>
+                <a:uFillTx/>
+                <a:latin typeface="+mn-lt"/>
+                <a:ea typeface="+mn-ea"/>
+                <a:cs typeface="+mn-cs"/>
+                <a:sym typeface="+mn-ea"/>
+              </a:rPr>
+              <a:t>1</a:t>
+            </a:r>
+            <a:endParaRPr lang="en-US"/>
+          </a:p>
+        </p:txBody>
+      </p:sp>
+      <p:sp>
+        <p:nvSpPr>
+          <p:cNvPr id="16" name="椭圆 15"/>
+          <p:cNvSpPr/>
+          <p:nvPr/>
+        </p:nvSpPr>
+        <p:spPr>
+          <a:xfrm>
+            <a:off x="4258945" y="759460"/>
+            <a:ext cx="676275" cy="634365"/>
+          </a:xfrm>
+          <a:prstGeom prst="ellipse">
+            <a:avLst/>
+          </a:prstGeom>
+          <a:gradFill>
+            <a:gsLst>
+              <a:gs pos="0">
+                <a:srgbClr val="FECF40"/>
+              </a:gs>
+              <a:gs pos="100000">
+                <a:srgbClr val="846C21"/>
+              </a:gs>
+            </a:gsLst>
+            <a:lin ang="5400000" scaled="0"/>
+          </a:gradFill>
+          <a:ln>
+            <a:solidFill>
+              <a:srgbClr val="3838A8"/>
+            </a:solidFill>
+          </a:ln>
+        </p:spPr>
+        <p:style>
+          <a:lnRef idx="2">
+            <a:schemeClr val="accent2">
+              <a:shade val="50000"/>
+            </a:schemeClr>
+          </a:lnRef>
+          <a:fillRef idx="1">
+            <a:schemeClr val="accent2"/>
+          </a:fillRef>
+          <a:effectRef idx="0">
+            <a:schemeClr val="accent2"/>
+          </a:effectRef>
+          <a:fontRef idx="minor">
+            <a:schemeClr val="lt1"/>
+          </a:fontRef>
+        </p:style>
+        <p:txBody>
+          <a:bodyPr anchor="ctr"/>
+          <a:p>
+            <a:pPr marL="0" marR="0" lvl="0" indent="0" algn="ctr" defTabSz="914400" rtl="0" eaLnBrk="1" fontAlgn="base" latinLnBrk="0" hangingPunct="1">
+              <a:spcBef>
+                <a:spcPct val="0"/>
+              </a:spcBef>
+              <a:spcAft>
+                <a:spcPct val="0"/>
+              </a:spcAft>
+              <a:buClrTx/>
+              <a:buSzTx/>
+              <a:buFont typeface="Arial" charset="0"/>
+              <a:buNone/>
+              <a:defRPr/>
+            </a:pPr>
+            <a:r>
+              <a:rPr lang="en-US"/>
+              <a:t>2</a:t>
+            </a:r>
+            <a:endParaRPr lang="en-US"/>
+          </a:p>
+        </p:txBody>
+      </p:sp>
       <p:sp>
         <p:nvSpPr>
           <p:cNvPr id="17" name="椭圆 16"/>
@@ -4107,7 +5061,7 @@
         </p:nvSpPr>
         <p:spPr>
           <a:xfrm>
-            <a:off x="9052560" y="2709545"/>
+            <a:off x="9201785" y="3483610"/>
             <a:ext cx="676275" cy="634365"/>
           </a:xfrm>
           <a:prstGeom prst="ellipse">

</xml_diff>